<commit_message>
update readme by code description
</commit_message>
<xml_diff>
--- a/resources/ppts/第4_5次.pptx
+++ b/resources/ppts/第4_5次.pptx
@@ -238,7 +238,7 @@
           <a:p>
             <a:fld id="{1F745408-ED27-4CAF-B7C3-B7AF6EFD131E}" type="datetimeFigureOut">
               <a:rPr lang="zh-CN" altLang="en-US" smtClean="0"/>
-              <a:t>2019/12/17</a:t>
+              <a:t>2020/2/3</a:t>
             </a:fld>
             <a:endParaRPr lang="zh-CN" altLang="en-US"/>
           </a:p>
@@ -19483,8 +19483,8 @@
           </a:p>
         </p:txBody>
       </p:sp>
-      <mc:AlternateContent xmlns:mc="http://schemas.openxmlformats.org/markup-compatibility/2006">
-        <mc:Choice xmlns:a14="http://schemas.microsoft.com/office/drawing/2010/main" Requires="a14">
+      <mc:AlternateContent xmlns:mc="http://schemas.openxmlformats.org/markup-compatibility/2006" xmlns:a14="http://schemas.microsoft.com/office/drawing/2010/main">
+        <mc:Choice Requires="a14">
           <p:sp>
             <p:nvSpPr>
               <p:cNvPr id="4" name="文本框 3">
@@ -20056,7 +20056,7 @@
             </p:txBody>
           </p:sp>
         </mc:Choice>
-        <mc:Fallback>
+        <mc:Fallback xmlns="">
           <p:sp>
             <p:nvSpPr>
               <p:cNvPr id="4" name="文本框 3">

</xml_diff>